<commit_message>
Poster: add decision-gates table and PDF export; update PPTX
</commit_message>
<xml_diff>
--- a/kg-mmml/reports/KG-MMML_Poster.pptx
+++ b/kg-mmml/reports/KG-MMML_Poster.pptx
@@ -3824,8 +3824,8 @@
           <p:nvPr/>
         </p:nvGraphicFramePr>
         <p:xfrm>
-          <a:off x="6492240" y="6217920"/>
-          <a:ext cx="5486400" cy="2377440"/>
+          <a:off x="6492240" y="7772400"/>
+          <a:ext cx="5486400" cy="1828800"/>
         </p:xfrm>
         <a:graphic>
           <a:graphicData uri="http://schemas.openxmlformats.org/drawingml/2006/chart">
@@ -3833,9 +3833,299 @@
           </a:graphicData>
         </a:graphic>
       </p:graphicFrame>
-      <p:sp>
-        <p:nvSpPr>
-          <p:cNvPr id="11" name="Rectangle 10"/>
+      <p:graphicFrame>
+        <p:nvGraphicFramePr>
+          <p:cNvPr id="11" name="Table 10"/>
+          <p:cNvGraphicFramePr>
+            <a:graphicFrameLocks noGrp="1"/>
+          </p:cNvGraphicFramePr>
+          <p:nvPr/>
+        </p:nvGraphicFramePr>
+        <p:xfrm>
+          <a:off x="6492240" y="6035040"/>
+          <a:ext cx="5486400" cy="1463040"/>
+        </p:xfrm>
+        <a:graphic>
+          <a:graphicData uri="http://schemas.openxmlformats.org/drawingml/2006/table">
+            <a:tbl>
+              <a:tblPr firstRow="1" bandRow="1">
+                <a:tableStyleId>{5C22544A-7EE6-4342-B048-85BDC9FD1C3A}</a:tableStyleId>
+              </a:tblPr>
+              <a:tblGrid>
+                <a:gridCol w="1371600"/>
+                <a:gridCol w="1371600"/>
+                <a:gridCol w="1371600"/>
+                <a:gridCol w="1371600"/>
+              </a:tblGrid>
+              <a:tr h="292608">
+                <a:tc>
+                  <a:txBody>
+                    <a:bodyPr/>
+                    <a:lstStyle/>
+                    <a:p>
+                      <a:pPr>
+                        <a:defRPr b="1"/>
+                      </a:pPr>
+                      <a:r>
+                        <a:t>Gate</a:t>
+                      </a:r>
+                    </a:p>
+                  </a:txBody>
+                  <a:tcPr/>
+                </a:tc>
+                <a:tc>
+                  <a:txBody>
+                    <a:bodyPr/>
+                    <a:lstStyle/>
+                    <a:p>
+                      <a:pPr>
+                        <a:defRPr b="1"/>
+                      </a:pPr>
+                      <a:r>
+                        <a:t>Target</a:t>
+                      </a:r>
+                    </a:p>
+                  </a:txBody>
+                  <a:tcPr/>
+                </a:tc>
+                <a:tc>
+                  <a:txBody>
+                    <a:bodyPr/>
+                    <a:lstStyle/>
+                    <a:p>
+                      <a:pPr>
+                        <a:defRPr b="1"/>
+                      </a:pPr>
+                      <a:r>
+                        <a:t>Actual</a:t>
+                      </a:r>
+                    </a:p>
+                  </a:txBody>
+                  <a:tcPr/>
+                </a:tc>
+                <a:tc>
+                  <a:txBody>
+                    <a:bodyPr/>
+                    <a:lstStyle/>
+                    <a:p>
+                      <a:pPr>
+                        <a:defRPr b="1"/>
+                      </a:pPr>
+                      <a:r>
+                        <a:t>Status</a:t>
+                      </a:r>
+                    </a:p>
+                  </a:txBody>
+                  <a:tcPr/>
+                </a:tc>
+              </a:tr>
+              <a:tr h="292608">
+                <a:tc>
+                  <a:txBody>
+                    <a:bodyPr/>
+                    <a:lstStyle/>
+                    <a:p>
+                      <a:r>
+                        <a:t>SRS</a:t>
+                      </a:r>
+                    </a:p>
+                  </a:txBody>
+                  <a:tcPr/>
+                </a:tc>
+                <a:tc>
+                  <a:txBody>
+                    <a:bodyPr/>
+                    <a:lstStyle/>
+                    <a:p>
+                      <a:r>
+                        <a:t>≥ 0.75</a:t>
+                      </a:r>
+                    </a:p>
+                  </a:txBody>
+                  <a:tcPr/>
+                </a:tc>
+                <a:tc>
+                  <a:txBody>
+                    <a:bodyPr/>
+                    <a:lstStyle/>
+                    <a:p>
+                      <a:r>
+                        <a:t>0.7571</a:t>
+                      </a:r>
+                    </a:p>
+                  </a:txBody>
+                  <a:tcPr/>
+                </a:tc>
+                <a:tc>
+                  <a:txBody>
+                    <a:bodyPr/>
+                    <a:lstStyle/>
+                    <a:p>
+                      <a:r>
+                        <a:t>PASS</a:t>
+                      </a:r>
+                    </a:p>
+                  </a:txBody>
+                  <a:tcPr/>
+                </a:tc>
+              </a:tr>
+              <a:tr h="292608">
+                <a:tc>
+                  <a:txBody>
+                    <a:bodyPr/>
+                    <a:lstStyle/>
+                    <a:p>
+                      <a:r>
+                        <a:t>Micro-F1 Δ</a:t>
+                      </a:r>
+                    </a:p>
+                  </a:txBody>
+                  <a:tcPr/>
+                </a:tc>
+                <a:tc>
+                  <a:txBody>
+                    <a:bodyPr/>
+                    <a:lstStyle/>
+                    <a:p>
+                      <a:r>
+                        <a:t>≥ +3.0pp</a:t>
+                      </a:r>
+                    </a:p>
+                  </a:txBody>
+                  <a:tcPr/>
+                </a:tc>
+                <a:tc>
+                  <a:txBody>
+                    <a:bodyPr/>
+                    <a:lstStyle/>
+                    <a:p>
+                      <a:r>
+                        <a:t>+1.36pp</a:t>
+                      </a:r>
+                    </a:p>
+                  </a:txBody>
+                  <a:tcPr/>
+                </a:tc>
+                <a:tc>
+                  <a:txBody>
+                    <a:bodyPr/>
+                    <a:lstStyle/>
+                    <a:p>
+                      <a:r>
+                        <a:t>FAIL</a:t>
+                      </a:r>
+                    </a:p>
+                  </a:txBody>
+                  <a:tcPr/>
+                </a:tc>
+              </a:tr>
+              <a:tr h="292608">
+                <a:tc>
+                  <a:txBody>
+                    <a:bodyPr/>
+                    <a:lstStyle/>
+                    <a:p>
+                      <a:r>
+                        <a:t>Latency p99</a:t>
+                      </a:r>
+                    </a:p>
+                  </a:txBody>
+                  <a:tcPr/>
+                </a:tc>
+                <a:tc>
+                  <a:txBody>
+                    <a:bodyPr/>
+                    <a:lstStyle/>
+                    <a:p>
+                      <a:r>
+                        <a:t>&lt; 150 ms</a:t>
+                      </a:r>
+                    </a:p>
+                  </a:txBody>
+                  <a:tcPr/>
+                </a:tc>
+                <a:tc>
+                  <a:txBody>
+                    <a:bodyPr/>
+                    <a:lstStyle/>
+                    <a:p>
+                      <a:r>
+                        <a:t>0.037 ms</a:t>
+                      </a:r>
+                    </a:p>
+                  </a:txBody>
+                  <a:tcPr/>
+                </a:tc>
+                <a:tc>
+                  <a:txBody>
+                    <a:bodyPr/>
+                    <a:lstStyle/>
+                    <a:p>
+                      <a:r>
+                        <a:t>PASS</a:t>
+                      </a:r>
+                    </a:p>
+                  </a:txBody>
+                  <a:tcPr/>
+                </a:tc>
+              </a:tr>
+              <a:tr h="292608">
+                <a:tc>
+                  <a:txBody>
+                    <a:bodyPr/>
+                    <a:lstStyle/>
+                    <a:p>
+                      <a:r>
+                        <a:t>HP</a:t>
+                      </a:r>
+                    </a:p>
+                  </a:txBody>
+                  <a:tcPr/>
+                </a:tc>
+                <a:tc>
+                  <a:txBody>
+                    <a:bodyPr/>
+                    <a:lstStyle/>
+                    <a:p>
+                      <a:r>
+                        <a:t>≥ 0.25</a:t>
+                      </a:r>
+                    </a:p>
+                  </a:txBody>
+                  <a:tcPr/>
+                </a:tc>
+                <a:tc>
+                  <a:txBody>
+                    <a:bodyPr/>
+                    <a:lstStyle/>
+                    <a:p>
+                      <a:r>
+                        <a:t>0.2726</a:t>
+                      </a:r>
+                    </a:p>
+                  </a:txBody>
+                  <a:tcPr/>
+                </a:tc>
+                <a:tc>
+                  <a:txBody>
+                    <a:bodyPr/>
+                    <a:lstStyle/>
+                    <a:p>
+                      <a:r>
+                        <a:t>PASS</a:t>
+                      </a:r>
+                    </a:p>
+                  </a:txBody>
+                  <a:tcPr/>
+                </a:tc>
+              </a:tr>
+            </a:tbl>
+          </a:graphicData>
+        </a:graphic>
+      </p:graphicFrame>
+      <p:sp>
+        <p:nvSpPr>
+          <p:cNvPr id="12" name="Rectangle 11"/>
           <p:cNvSpPr/>
           <p:nvPr/>
         </p:nvSpPr>

</xml_diff>